<commit_message>
Képek, szövegek behelyezve a hiányos helyeken.
</commit_message>
<xml_diff>
--- a/VizsgaremekPP.pptx
+++ b/VizsgaremekPP.pptx
@@ -248,7 +248,7 @@
           <a:p>
             <a:fld id="{DB0193E8-478D-464D-8400-8CD4306FD776}" type="datetimeFigureOut">
               <a:rPr lang="hu-HU" smtClean="0"/>
-              <a:t>2026. 01. 23.</a:t>
+              <a:t>2026. 01. 24.</a:t>
             </a:fld>
             <a:endParaRPr lang="hu-HU"/>
           </a:p>
@@ -416,7 +416,7 @@
           <a:p>
             <a:fld id="{DB0193E8-478D-464D-8400-8CD4306FD776}" type="datetimeFigureOut">
               <a:rPr lang="hu-HU" smtClean="0"/>
-              <a:t>2026. 01. 23.</a:t>
+              <a:t>2026. 01. 24.</a:t>
             </a:fld>
             <a:endParaRPr lang="hu-HU"/>
           </a:p>
@@ -594,7 +594,7 @@
           <a:p>
             <a:fld id="{DB0193E8-478D-464D-8400-8CD4306FD776}" type="datetimeFigureOut">
               <a:rPr lang="hu-HU" smtClean="0"/>
-              <a:t>2026. 01. 23.</a:t>
+              <a:t>2026. 01. 24.</a:t>
             </a:fld>
             <a:endParaRPr lang="hu-HU"/>
           </a:p>
@@ -762,7 +762,7 @@
           <a:p>
             <a:fld id="{DB0193E8-478D-464D-8400-8CD4306FD776}" type="datetimeFigureOut">
               <a:rPr lang="hu-HU" smtClean="0"/>
-              <a:t>2026. 01. 23.</a:t>
+              <a:t>2026. 01. 24.</a:t>
             </a:fld>
             <a:endParaRPr lang="hu-HU"/>
           </a:p>
@@ -1007,7 +1007,7 @@
           <a:p>
             <a:fld id="{DB0193E8-478D-464D-8400-8CD4306FD776}" type="datetimeFigureOut">
               <a:rPr lang="hu-HU" smtClean="0"/>
-              <a:t>2026. 01. 23.</a:t>
+              <a:t>2026. 01. 24.</a:t>
             </a:fld>
             <a:endParaRPr lang="hu-HU"/>
           </a:p>
@@ -1236,7 +1236,7 @@
           <a:p>
             <a:fld id="{DB0193E8-478D-464D-8400-8CD4306FD776}" type="datetimeFigureOut">
               <a:rPr lang="hu-HU" smtClean="0"/>
-              <a:t>2026. 01. 23.</a:t>
+              <a:t>2026. 01. 24.</a:t>
             </a:fld>
             <a:endParaRPr lang="hu-HU"/>
           </a:p>
@@ -1600,7 +1600,7 @@
           <a:p>
             <a:fld id="{DB0193E8-478D-464D-8400-8CD4306FD776}" type="datetimeFigureOut">
               <a:rPr lang="hu-HU" smtClean="0"/>
-              <a:t>2026. 01. 23.</a:t>
+              <a:t>2026. 01. 24.</a:t>
             </a:fld>
             <a:endParaRPr lang="hu-HU"/>
           </a:p>
@@ -1717,7 +1717,7 @@
           <a:p>
             <a:fld id="{DB0193E8-478D-464D-8400-8CD4306FD776}" type="datetimeFigureOut">
               <a:rPr lang="hu-HU" smtClean="0"/>
-              <a:t>2026. 01. 23.</a:t>
+              <a:t>2026. 01. 24.</a:t>
             </a:fld>
             <a:endParaRPr lang="hu-HU"/>
           </a:p>
@@ -1812,7 +1812,7 @@
           <a:p>
             <a:fld id="{DB0193E8-478D-464D-8400-8CD4306FD776}" type="datetimeFigureOut">
               <a:rPr lang="hu-HU" smtClean="0"/>
-              <a:t>2026. 01. 23.</a:t>
+              <a:t>2026. 01. 24.</a:t>
             </a:fld>
             <a:endParaRPr lang="hu-HU"/>
           </a:p>
@@ -2087,7 +2087,7 @@
           <a:p>
             <a:fld id="{DB0193E8-478D-464D-8400-8CD4306FD776}" type="datetimeFigureOut">
               <a:rPr lang="hu-HU" smtClean="0"/>
-              <a:t>2026. 01. 23.</a:t>
+              <a:t>2026. 01. 24.</a:t>
             </a:fld>
             <a:endParaRPr lang="hu-HU"/>
           </a:p>
@@ -2339,7 +2339,7 @@
           <a:p>
             <a:fld id="{DB0193E8-478D-464D-8400-8CD4306FD776}" type="datetimeFigureOut">
               <a:rPr lang="hu-HU" smtClean="0"/>
-              <a:t>2026. 01. 23.</a:t>
+              <a:t>2026. 01. 24.</a:t>
             </a:fld>
             <a:endParaRPr lang="hu-HU"/>
           </a:p>
@@ -2550,7 +2550,7 @@
           <a:p>
             <a:fld id="{DB0193E8-478D-464D-8400-8CD4306FD776}" type="datetimeFigureOut">
               <a:rPr lang="hu-HU" smtClean="0"/>
-              <a:t>2026. 01. 23.</a:t>
+              <a:t>2026. 01. 24.</a:t>
             </a:fld>
             <a:endParaRPr lang="hu-HU"/>
           </a:p>
@@ -3508,8 +3508,8 @@
         </p:nvSpPr>
         <p:spPr>
           <a:xfrm>
-            <a:off x="61727" y="715997"/>
-            <a:ext cx="6335511" cy="5693866"/>
+            <a:off x="61727" y="1670103"/>
+            <a:ext cx="6335511" cy="3785652"/>
           </a:xfrm>
           <a:prstGeom prst="rect">
             <a:avLst/>
@@ -3527,7 +3527,7 @@
               <a:buChar char="•"/>
             </a:pPr>
             <a:r>
-              <a:rPr lang="hu-HU" sz="2800" dirty="0">
+              <a:rPr lang="hu-HU" sz="2400" dirty="0">
                 <a:solidFill>
                   <a:schemeClr val="accent4">
                     <a:lumMod val="75000"/>
@@ -3542,7 +3542,7 @@
               <a:buFont typeface="Arial" panose="020B0604020202020204" pitchFamily="34" charset="0"/>
               <a:buChar char="•"/>
             </a:pPr>
-            <a:endParaRPr lang="hu-HU" sz="2800" dirty="0">
+            <a:endParaRPr lang="hu-HU" sz="2400" dirty="0">
               <a:solidFill>
                 <a:schemeClr val="accent4">
                   <a:lumMod val="75000"/>
@@ -3556,7 +3556,7 @@
               <a:buChar char="•"/>
             </a:pPr>
             <a:r>
-              <a:rPr lang="hu-HU" sz="2800" dirty="0">
+              <a:rPr lang="hu-HU" sz="2400" dirty="0">
                 <a:solidFill>
                   <a:schemeClr val="accent4">
                     <a:lumMod val="75000"/>
@@ -3571,7 +3571,7 @@
               <a:buFont typeface="Arial" panose="020B0604020202020204" pitchFamily="34" charset="0"/>
               <a:buChar char="•"/>
             </a:pPr>
-            <a:endParaRPr lang="hu-HU" sz="2800" dirty="0">
+            <a:endParaRPr lang="hu-HU" sz="2400" dirty="0">
               <a:solidFill>
                 <a:schemeClr val="accent4">
                   <a:lumMod val="75000"/>
@@ -3585,7 +3585,7 @@
               <a:buChar char="•"/>
             </a:pPr>
             <a:r>
-              <a:rPr lang="hu-HU" sz="2800" dirty="0">
+              <a:rPr lang="hu-HU" sz="2400" dirty="0">
                 <a:solidFill>
                   <a:schemeClr val="accent4">
                     <a:lumMod val="75000"/>
@@ -3594,32 +3594,6 @@
               </a:rPr>
               <a:t>A Weboldalon csakis regisztráció, után, illetve bejelentkezéssel lehet rendelni. </a:t>
             </a:r>
-          </a:p>
-          <a:p>
-            <a:pPr marL="457200" indent="-457200" algn="just">
-              <a:buFont typeface="Arial" panose="020B0604020202020204" pitchFamily="34" charset="0"/>
-              <a:buChar char="•"/>
-            </a:pPr>
-            <a:endParaRPr lang="hu-HU" sz="2800" dirty="0">
-              <a:solidFill>
-                <a:schemeClr val="accent4">
-                  <a:lumMod val="75000"/>
-                </a:schemeClr>
-              </a:solidFill>
-            </a:endParaRPr>
-          </a:p>
-          <a:p>
-            <a:pPr marL="457200" indent="-457200" algn="just">
-              <a:buFont typeface="Arial" panose="020B0604020202020204" pitchFamily="34" charset="0"/>
-              <a:buChar char="•"/>
-            </a:pPr>
-            <a:endParaRPr lang="hu-HU" sz="2800" dirty="0">
-              <a:solidFill>
-                <a:schemeClr val="accent4">
-                  <a:lumMod val="75000"/>
-                </a:schemeClr>
-              </a:solidFill>
-            </a:endParaRPr>
           </a:p>
         </p:txBody>
       </p:sp>
@@ -4043,7 +4017,7 @@
         </p:blipFill>
         <p:spPr bwMode="auto">
           <a:xfrm>
-            <a:off x="490537" y="1073150"/>
+            <a:off x="512964" y="1264346"/>
             <a:ext cx="1709738" cy="1709738"/>
           </a:xfrm>
           <a:prstGeom prst="rect">
@@ -4373,8 +4347,8 @@
         </p:blipFill>
         <p:spPr>
           <a:xfrm>
-            <a:off x="8274750" y="1042980"/>
-            <a:ext cx="3782627" cy="2757576"/>
+            <a:off x="7387069" y="1890879"/>
+            <a:ext cx="4646987" cy="3387704"/>
           </a:xfrm>
           <a:prstGeom prst="rect">
             <a:avLst/>
@@ -4402,6 +4376,13 @@
   <p:transition spd="med">
     <p:pull/>
   </p:transition>
+  <p:timing>
+    <p:tnLst>
+      <p:par>
+        <p:cTn id="1" dur="indefinite" restart="never" nodeType="tmRoot"/>
+      </p:par>
+    </p:tnLst>
+  </p:timing>
 </p:sld>
 </file>
 
@@ -4604,7 +4585,7 @@
         </p:nvSpPr>
         <p:spPr>
           <a:xfrm>
-            <a:off x="512964" y="1042980"/>
+            <a:off x="1925354" y="1324020"/>
             <a:ext cx="5132719" cy="1200329"/>
           </a:xfrm>
           <a:prstGeom prst="rect">
@@ -4640,8 +4621,55 @@
                   </a:schemeClr>
                 </a:solidFill>
               </a:rPr>
-              <a:t>: Egy weblap készítő nyelv, mely segítségével a weboldal vázát készítettük</a:t>
-            </a:r>
+              <a:t>: </a:t>
+            </a:r>
+            <a:r>
+              <a:rPr lang="hu-HU" sz="2400" dirty="0">
+                <a:solidFill>
+                  <a:schemeClr val="accent4">
+                    <a:lumMod val="75000"/>
+                  </a:schemeClr>
+                </a:solidFill>
+              </a:rPr>
+              <a:t>W</a:t>
+            </a:r>
+            <a:r>
+              <a:rPr lang="hu-HU" sz="2400" dirty="0" smtClean="0">
+                <a:solidFill>
+                  <a:schemeClr val="accent4">
+                    <a:lumMod val="75000"/>
+                  </a:schemeClr>
+                </a:solidFill>
+              </a:rPr>
+              <a:t>eblap </a:t>
+            </a:r>
+            <a:r>
+              <a:rPr lang="hu-HU" sz="2400" dirty="0">
+                <a:solidFill>
+                  <a:schemeClr val="accent4">
+                    <a:lumMod val="75000"/>
+                  </a:schemeClr>
+                </a:solidFill>
+              </a:rPr>
+              <a:t>készítő nyelv, mely segítségével a weboldal vázát </a:t>
+            </a:r>
+            <a:r>
+              <a:rPr lang="hu-HU" sz="2400" dirty="0" smtClean="0">
+                <a:solidFill>
+                  <a:schemeClr val="accent4">
+                    <a:lumMod val="75000"/>
+                  </a:schemeClr>
+                </a:solidFill>
+              </a:rPr>
+              <a:t>készítettük.</a:t>
+            </a:r>
+            <a:endParaRPr lang="hu-HU" sz="2400" dirty="0">
+              <a:solidFill>
+                <a:schemeClr val="accent4">
+                  <a:lumMod val="75000"/>
+                </a:schemeClr>
+              </a:solidFill>
+            </a:endParaRPr>
           </a:p>
         </p:txBody>
       </p:sp>
@@ -4659,7 +4687,7 @@
         </p:nvSpPr>
         <p:spPr>
           <a:xfrm>
-            <a:off x="6931216" y="1042980"/>
+            <a:off x="1925354" y="3003272"/>
             <a:ext cx="4272954" cy="1200329"/>
           </a:xfrm>
           <a:prstGeom prst="rect">
@@ -4688,6 +4716,16 @@
               <a:t>CSS3: </a:t>
             </a:r>
             <a:r>
+              <a:rPr lang="hu-HU" sz="2400" dirty="0" smtClean="0">
+                <a:solidFill>
+                  <a:schemeClr val="accent4">
+                    <a:lumMod val="75000"/>
+                  </a:schemeClr>
+                </a:solidFill>
+              </a:rPr>
+              <a:t>Stíluskezelő </a:t>
+            </a:r>
+            <a:r>
               <a:rPr lang="hu-HU" sz="2400" dirty="0">
                 <a:solidFill>
                   <a:schemeClr val="accent4">
@@ -4695,7 +4733,7 @@
                   </a:schemeClr>
                 </a:solidFill>
               </a:rPr>
-              <a:t>Egy stíluskezelő nyelv, mely segítségével a weboldal kinézetét alkottuk meg.</a:t>
+              <a:t>nyelv, mely segítségével a weboldal kinézetét alkottuk meg.</a:t>
             </a:r>
           </a:p>
         </p:txBody>
@@ -4714,7 +4752,7 @@
         </p:nvSpPr>
         <p:spPr>
           <a:xfrm>
-            <a:off x="3837602" y="5122946"/>
+            <a:off x="1925354" y="4708388"/>
             <a:ext cx="4272954" cy="1569660"/>
           </a:xfrm>
           <a:prstGeom prst="rect">
@@ -4750,17 +4788,37 @@
                   </a:schemeClr>
                 </a:solidFill>
               </a:rPr>
-              <a:t>Egy olyan nyelv, mely segítségével a weboldalt dinamikussá tettük, illetve eseményeit kezeltük</a:t>
-            </a:r>
-            <a:r>
-              <a:rPr lang="hu-HU" sz="2400" b="1" dirty="0">
-                <a:solidFill>
-                  <a:schemeClr val="accent4">
-                    <a:lumMod val="75000"/>
-                  </a:schemeClr>
-                </a:solidFill>
-              </a:rPr>
-              <a:t> </a:t>
+              <a:t>O</a:t>
+            </a:r>
+            <a:r>
+              <a:rPr lang="hu-HU" sz="2400" dirty="0" smtClean="0">
+                <a:solidFill>
+                  <a:schemeClr val="accent4">
+                    <a:lumMod val="75000"/>
+                  </a:schemeClr>
+                </a:solidFill>
+              </a:rPr>
+              <a:t>lyan </a:t>
+            </a:r>
+            <a:r>
+              <a:rPr lang="hu-HU" sz="2400" dirty="0">
+                <a:solidFill>
+                  <a:schemeClr val="accent4">
+                    <a:lumMod val="75000"/>
+                  </a:schemeClr>
+                </a:solidFill>
+              </a:rPr>
+              <a:t>nyelv, mely segítségével a weboldalt dinamikussá tettük, illetve eseményeit </a:t>
+            </a:r>
+            <a:r>
+              <a:rPr lang="hu-HU" sz="2400" dirty="0" smtClean="0">
+                <a:solidFill>
+                  <a:schemeClr val="accent4">
+                    <a:lumMod val="75000"/>
+                  </a:schemeClr>
+                </a:solidFill>
+              </a:rPr>
+              <a:t>kezeltük.</a:t>
             </a:r>
             <a:endParaRPr lang="hu-HU" sz="2400" dirty="0">
               <a:solidFill>
@@ -4772,6 +4830,167 @@
           </a:p>
         </p:txBody>
       </p:sp>
+      <p:pic>
+        <p:nvPicPr>
+          <p:cNvPr id="1026" name="Picture 2" descr="undefined"/>
+          <p:cNvPicPr>
+            <a:picLocks noChangeAspect="1" noChangeArrowheads="1"/>
+          </p:cNvPicPr>
+          <p:nvPr/>
+        </p:nvPicPr>
+        <p:blipFill>
+          <a:blip r:embed="rId3" cstate="print">
+            <a:extLst>
+              <a:ext uri="{28A0092B-C50C-407E-A947-70E740481C1C}">
+                <a14:useLocalDpi xmlns:a14="http://schemas.microsoft.com/office/drawing/2010/main" val="0"/>
+              </a:ext>
+            </a:extLst>
+          </a:blip>
+          <a:srcRect/>
+          <a:stretch>
+            <a:fillRect/>
+          </a:stretch>
+        </p:blipFill>
+        <p:spPr bwMode="auto">
+          <a:xfrm>
+            <a:off x="341311" y="1098911"/>
+            <a:ext cx="1584043" cy="1584043"/>
+          </a:xfrm>
+          <a:prstGeom prst="rect">
+            <a:avLst/>
+          </a:prstGeom>
+          <a:noFill/>
+          <a:extLst>
+            <a:ext uri="{909E8E84-426E-40DD-AFC4-6F175D3DCCD1}">
+              <a14:hiddenFill xmlns:a14="http://schemas.microsoft.com/office/drawing/2010/main">
+                <a:solidFill>
+                  <a:srgbClr val="FFFFFF"/>
+                </a:solidFill>
+              </a14:hiddenFill>
+            </a:ext>
+          </a:extLst>
+        </p:spPr>
+      </p:pic>
+      <p:pic>
+        <p:nvPicPr>
+          <p:cNvPr id="1028" name="Picture 4" descr="undefined"/>
+          <p:cNvPicPr>
+            <a:picLocks noChangeAspect="1" noChangeArrowheads="1"/>
+          </p:cNvPicPr>
+          <p:nvPr/>
+        </p:nvPicPr>
+        <p:blipFill>
+          <a:blip r:embed="rId4" cstate="print">
+            <a:extLst>
+              <a:ext uri="{28A0092B-C50C-407E-A947-70E740481C1C}">
+                <a14:useLocalDpi xmlns:a14="http://schemas.microsoft.com/office/drawing/2010/main" val="0"/>
+              </a:ext>
+            </a:extLst>
+          </a:blip>
+          <a:srcRect/>
+          <a:stretch>
+            <a:fillRect/>
+          </a:stretch>
+        </p:blipFill>
+        <p:spPr bwMode="auto">
+          <a:xfrm>
+            <a:off x="455240" y="2970021"/>
+            <a:ext cx="1356187" cy="1356187"/>
+          </a:xfrm>
+          <a:prstGeom prst="rect">
+            <a:avLst/>
+          </a:prstGeom>
+          <a:noFill/>
+          <a:extLst>
+            <a:ext uri="{909E8E84-426E-40DD-AFC4-6F175D3DCCD1}">
+              <a14:hiddenFill xmlns:a14="http://schemas.microsoft.com/office/drawing/2010/main">
+                <a:solidFill>
+                  <a:srgbClr val="FFFFFF"/>
+                </a:solidFill>
+              </a14:hiddenFill>
+            </a:ext>
+          </a:extLst>
+        </p:spPr>
+      </p:pic>
+      <p:pic>
+        <p:nvPicPr>
+          <p:cNvPr id="1030" name="Picture 6" descr="undefined"/>
+          <p:cNvPicPr>
+            <a:picLocks noChangeAspect="1" noChangeArrowheads="1"/>
+          </p:cNvPicPr>
+          <p:nvPr/>
+        </p:nvPicPr>
+        <p:blipFill>
+          <a:blip r:embed="rId5" cstate="print">
+            <a:extLst>
+              <a:ext uri="{28A0092B-C50C-407E-A947-70E740481C1C}">
+                <a14:useLocalDpi xmlns:a14="http://schemas.microsoft.com/office/drawing/2010/main" val="0"/>
+              </a:ext>
+            </a:extLst>
+          </a:blip>
+          <a:srcRect/>
+          <a:stretch>
+            <a:fillRect/>
+          </a:stretch>
+        </p:blipFill>
+        <p:spPr bwMode="auto">
+          <a:xfrm>
+            <a:off x="367954" y="4675137"/>
+            <a:ext cx="1530761" cy="1530761"/>
+          </a:xfrm>
+          <a:prstGeom prst="rect">
+            <a:avLst/>
+          </a:prstGeom>
+          <a:noFill/>
+          <a:extLst>
+            <a:ext uri="{909E8E84-426E-40DD-AFC4-6F175D3DCCD1}">
+              <a14:hiddenFill xmlns:a14="http://schemas.microsoft.com/office/drawing/2010/main">
+                <a:solidFill>
+                  <a:srgbClr val="FFFFFF"/>
+                </a:solidFill>
+              </a14:hiddenFill>
+            </a:ext>
+          </a:extLst>
+        </p:spPr>
+      </p:pic>
+      <p:pic>
+        <p:nvPicPr>
+          <p:cNvPr id="6" name="Kép 5"/>
+          <p:cNvPicPr>
+            <a:picLocks noChangeAspect="1"/>
+          </p:cNvPicPr>
+          <p:nvPr/>
+        </p:nvPicPr>
+        <p:blipFill>
+          <a:blip r:embed="rId6" cstate="print">
+            <a:extLst>
+              <a:ext uri="{28A0092B-C50C-407E-A947-70E740481C1C}">
+                <a14:useLocalDpi xmlns:a14="http://schemas.microsoft.com/office/drawing/2010/main" val="0"/>
+              </a:ext>
+            </a:extLst>
+          </a:blip>
+          <a:stretch>
+            <a:fillRect/>
+          </a:stretch>
+        </p:blipFill>
+        <p:spPr>
+          <a:xfrm>
+            <a:off x="7810106" y="1098911"/>
+            <a:ext cx="2109967" cy="5582857"/>
+          </a:xfrm>
+          <a:prstGeom prst="rect">
+            <a:avLst/>
+          </a:prstGeom>
+          <a:ln w="38100">
+            <a:solidFill>
+              <a:schemeClr val="accent1">
+                <a:lumMod val="60000"/>
+                <a:lumOff val="40000"/>
+              </a:schemeClr>
+            </a:solidFill>
+          </a:ln>
+        </p:spPr>
+      </p:pic>
     </p:spTree>
     <p:extLst>
       <p:ext uri="{BB962C8B-B14F-4D97-AF65-F5344CB8AC3E}">
@@ -4785,6 +5004,13 @@
   <p:transition spd="med">
     <p:pull/>
   </p:transition>
+  <p:timing>
+    <p:tnLst>
+      <p:par>
+        <p:cTn id="1" dur="indefinite" restart="never" nodeType="tmRoot"/>
+      </p:par>
+    </p:tnLst>
+  </p:timing>
 </p:sld>
 </file>
 
@@ -5017,7 +5243,7 @@
         </p:blipFill>
         <p:spPr bwMode="auto">
           <a:xfrm>
-            <a:off x="731043" y="4342993"/>
+            <a:off x="477140" y="4035422"/>
             <a:ext cx="3534749" cy="1488461"/>
           </a:xfrm>
           <a:prstGeom prst="rect">
@@ -5104,7 +5330,7 @@
         </p:nvSpPr>
         <p:spPr>
           <a:xfrm>
-            <a:off x="4265793" y="4625558"/>
+            <a:off x="4142095" y="4450991"/>
             <a:ext cx="3955182" cy="1938992"/>
           </a:xfrm>
           <a:prstGeom prst="rect">
@@ -5140,7 +5366,27 @@
                   </a:schemeClr>
                 </a:solidFill>
               </a:rPr>
-              <a:t>: Projektmenedzsment weboldal, melyben követhetővé, tettük a projekt egyes részfeladatait.</a:t>
+              <a:t>: Projektmenedzsment weboldal, melyben </a:t>
+            </a:r>
+            <a:r>
+              <a:rPr lang="hu-HU" sz="2400" dirty="0" smtClean="0">
+                <a:solidFill>
+                  <a:schemeClr val="accent4">
+                    <a:lumMod val="75000"/>
+                  </a:schemeClr>
+                </a:solidFill>
+              </a:rPr>
+              <a:t>követhetővé </a:t>
+            </a:r>
+            <a:r>
+              <a:rPr lang="hu-HU" sz="2400" dirty="0">
+                <a:solidFill>
+                  <a:schemeClr val="accent4">
+                    <a:lumMod val="75000"/>
+                  </a:schemeClr>
+                </a:solidFill>
+              </a:rPr>
+              <a:t>tettük a projekt egyes részfeladatait.</a:t>
             </a:r>
           </a:p>
         </p:txBody>
@@ -5234,6 +5480,13 @@
   <p:transition spd="med">
     <p:pull/>
   </p:transition>
+  <p:timing>
+    <p:tnLst>
+      <p:par>
+        <p:cTn id="1" dur="indefinite" restart="never" nodeType="tmRoot"/>
+      </p:par>
+    </p:tnLst>
+  </p:timing>
 </p:sld>
 </file>
 
@@ -5385,7 +5638,39 @@
                 </a:solidFill>
                 <a:latin typeface="Ink Free" panose="03080402000500000000" pitchFamily="66" charset="0"/>
               </a:rPr>
-              <a:t>Csomagkezelők</a:t>
+              <a:t>Csomagkezel</a:t>
+            </a:r>
+            <a:r>
+              <a:rPr lang="hu-HU" sz="4400" dirty="0">
+                <a:ln w="6350">
+                  <a:solidFill>
+                    <a:schemeClr val="accent1">
+                      <a:lumMod val="75000"/>
+                    </a:schemeClr>
+                  </a:solidFill>
+                </a:ln>
+                <a:solidFill>
+                  <a:schemeClr val="bg1"/>
+                </a:solidFill>
+                <a:latin typeface="Ink Free" panose="03080402000500000000" pitchFamily="66" charset="0"/>
+              </a:rPr>
+              <a:t>ő</a:t>
+            </a:r>
+            <a:r>
+              <a:rPr lang="hu-HU" sz="4400" b="1" dirty="0">
+                <a:ln w="6350">
+                  <a:solidFill>
+                    <a:schemeClr val="accent1">
+                      <a:lumMod val="75000"/>
+                    </a:schemeClr>
+                  </a:solidFill>
+                </a:ln>
+                <a:solidFill>
+                  <a:schemeClr val="bg1"/>
+                </a:solidFill>
+                <a:latin typeface="Ink Free" panose="03080402000500000000" pitchFamily="66" charset="0"/>
+              </a:rPr>
+              <a:t>k</a:t>
             </a:r>
           </a:p>
         </p:txBody>
@@ -5404,8 +5689,8 @@
         </p:nvSpPr>
         <p:spPr>
           <a:xfrm>
-            <a:off x="2493033" y="1475858"/>
-            <a:ext cx="5132719" cy="1938992"/>
+            <a:off x="3840050" y="1585575"/>
+            <a:ext cx="4081980" cy="2308324"/>
           </a:xfrm>
           <a:prstGeom prst="rect">
             <a:avLst/>
@@ -5440,7 +5725,27 @@
                   </a:schemeClr>
                 </a:solidFill>
               </a:rPr>
-              <a:t>: A JavaScript csomagkezelője, mely segítségével a Backend Szerverhez szükséges </a:t>
+              <a:t>: A </a:t>
+            </a:r>
+            <a:r>
+              <a:rPr lang="hu-HU" sz="2400" dirty="0" smtClean="0">
+                <a:solidFill>
+                  <a:schemeClr val="accent4">
+                    <a:lumMod val="75000"/>
+                  </a:schemeClr>
+                </a:solidFill>
+              </a:rPr>
+              <a:t>JavaScript csomagkezelője</a:t>
+            </a:r>
+            <a:r>
+              <a:rPr lang="hu-HU" sz="2400" dirty="0">
+                <a:solidFill>
+                  <a:schemeClr val="accent4">
+                    <a:lumMod val="75000"/>
+                  </a:schemeClr>
+                </a:solidFill>
+              </a:rPr>
+              <a:t>, mely segítségével a Backend Szerverhez szükséges </a:t>
             </a:r>
             <a:r>
               <a:rPr lang="hu-HU" sz="2400" dirty="0" err="1">
@@ -5533,7 +5838,7 @@
         </p:blipFill>
         <p:spPr bwMode="auto">
           <a:xfrm>
-            <a:off x="490537" y="4111625"/>
+            <a:off x="394312" y="4111624"/>
             <a:ext cx="3445737" cy="1163077"/>
           </a:xfrm>
           <a:prstGeom prst="rect">
@@ -5565,7 +5870,7 @@
         </p:nvSpPr>
         <p:spPr>
           <a:xfrm>
-            <a:off x="3936274" y="4095387"/>
+            <a:off x="3840049" y="4093733"/>
             <a:ext cx="4272954" cy="2677656"/>
           </a:xfrm>
           <a:prstGeom prst="rect">
@@ -5708,7 +6013,7 @@
         </p:blipFill>
         <p:spPr>
           <a:xfrm>
-            <a:off x="8462856" y="4098341"/>
+            <a:off x="8421292" y="4093733"/>
             <a:ext cx="3655248" cy="2361937"/>
           </a:xfrm>
           <a:prstGeom prst="rect">
@@ -5719,6 +6024,79 @@
               <a:schemeClr val="accent1">
                 <a:lumMod val="40000"/>
                 <a:lumOff val="60000"/>
+              </a:schemeClr>
+            </a:solidFill>
+          </a:ln>
+        </p:spPr>
+      </p:pic>
+      <p:pic>
+        <p:nvPicPr>
+          <p:cNvPr id="2050" name="Picture 2" descr="undefined"/>
+          <p:cNvPicPr>
+            <a:picLocks noChangeAspect="1" noChangeArrowheads="1"/>
+          </p:cNvPicPr>
+          <p:nvPr/>
+        </p:nvPicPr>
+        <p:blipFill>
+          <a:blip r:embed="rId5" cstate="print">
+            <a:extLst>
+              <a:ext uri="{28A0092B-C50C-407E-A947-70E740481C1C}">
+                <a14:useLocalDpi xmlns:a14="http://schemas.microsoft.com/office/drawing/2010/main" val="0"/>
+              </a:ext>
+            </a:extLst>
+          </a:blip>
+          <a:srcRect/>
+          <a:stretch>
+            <a:fillRect/>
+          </a:stretch>
+        </p:blipFill>
+        <p:spPr bwMode="auto">
+          <a:xfrm>
+            <a:off x="365761" y="1491070"/>
+            <a:ext cx="3474288" cy="2128002"/>
+          </a:xfrm>
+          <a:prstGeom prst="rect">
+            <a:avLst/>
+          </a:prstGeom>
+          <a:noFill/>
+          <a:extLst>
+            <a:ext uri="{909E8E84-426E-40DD-AFC4-6F175D3DCCD1}">
+              <a14:hiddenFill xmlns:a14="http://schemas.microsoft.com/office/drawing/2010/main">
+                <a:solidFill>
+                  <a:srgbClr val="FFFFFF"/>
+                </a:solidFill>
+              </a14:hiddenFill>
+            </a:ext>
+          </a:extLst>
+        </p:spPr>
+      </p:pic>
+      <p:pic>
+        <p:nvPicPr>
+          <p:cNvPr id="5" name="Kép 4"/>
+          <p:cNvPicPr>
+            <a:picLocks noChangeAspect="1"/>
+          </p:cNvPicPr>
+          <p:nvPr/>
+        </p:nvPicPr>
+        <p:blipFill>
+          <a:blip r:embed="rId6"/>
+          <a:stretch>
+            <a:fillRect/>
+          </a:stretch>
+        </p:blipFill>
+        <p:spPr>
+          <a:xfrm>
+            <a:off x="7949373" y="1393564"/>
+            <a:ext cx="4127167" cy="1942776"/>
+          </a:xfrm>
+          <a:prstGeom prst="rect">
+            <a:avLst/>
+          </a:prstGeom>
+          <a:ln w="38100">
+            <a:solidFill>
+              <a:schemeClr val="accent1">
+                <a:lumMod val="60000"/>
+                <a:lumOff val="40000"/>
               </a:schemeClr>
             </a:solidFill>
           </a:ln>
@@ -5737,6 +6115,13 @@
   <p:transition spd="med">
     <p:pull/>
   </p:transition>
+  <p:timing>
+    <p:tnLst>
+      <p:par>
+        <p:cTn id="1" dur="indefinite" restart="never" nodeType="tmRoot"/>
+      </p:par>
+    </p:tnLst>
+  </p:timing>
 </p:sld>
 </file>
 
@@ -5907,8 +6292,8 @@
         </p:nvSpPr>
         <p:spPr>
           <a:xfrm>
-            <a:off x="235023" y="1258144"/>
-            <a:ext cx="5132719" cy="461665"/>
+            <a:off x="3100649" y="1856659"/>
+            <a:ext cx="3973482" cy="2308324"/>
           </a:xfrm>
           <a:prstGeom prst="rect">
             <a:avLst/>
@@ -5933,7 +6318,27 @@
                   </a:schemeClr>
                 </a:solidFill>
               </a:rPr>
-              <a:t>C#</a:t>
+              <a:t>C</a:t>
+            </a:r>
+            <a:r>
+              <a:rPr lang="hu-HU" sz="2400" b="1" dirty="0" smtClean="0">
+                <a:solidFill>
+                  <a:schemeClr val="accent4">
+                    <a:lumMod val="75000"/>
+                  </a:schemeClr>
+                </a:solidFill>
+              </a:rPr>
+              <a:t>#</a:t>
+            </a:r>
+            <a:r>
+              <a:rPr lang="hu-HU" sz="2400" dirty="0" smtClean="0">
+                <a:solidFill>
+                  <a:schemeClr val="accent4">
+                    <a:lumMod val="75000"/>
+                  </a:schemeClr>
+                </a:solidFill>
+              </a:rPr>
+              <a:t>: Objektumorientált programozási nyelv. A WPF nyíltforrású felhasználói felület keretrendszert használtuk projektünk adatbázis kezelésére is.</a:t>
             </a:r>
             <a:endParaRPr lang="hu-HU" sz="2400" dirty="0">
               <a:solidFill>
@@ -5945,58 +6350,47 @@
           </a:p>
         </p:txBody>
       </p:sp>
-      <p:sp>
-        <p:nvSpPr>
-          <p:cNvPr id="12" name="Szövegdoboz 11">
+      <p:pic>
+        <p:nvPicPr>
+          <p:cNvPr id="3074" name="Picture 2" descr="undefined"/>
+          <p:cNvPicPr>
+            <a:picLocks noChangeAspect="1" noChangeArrowheads="1"/>
+          </p:cNvPicPr>
+          <p:nvPr/>
+        </p:nvPicPr>
+        <p:blipFill>
+          <a:blip r:embed="rId3" cstate="print">
             <a:extLst>
-              <a:ext uri="{FF2B5EF4-FFF2-40B4-BE49-F238E27FC236}">
-                <a16:creationId xmlns:a16="http://schemas.microsoft.com/office/drawing/2014/main" id="{6817D205-F060-4773-96FB-315513351D94}"/>
+              <a:ext uri="{28A0092B-C50C-407E-A947-70E740481C1C}">
+                <a14:useLocalDpi xmlns:a14="http://schemas.microsoft.com/office/drawing/2010/main" val="0"/>
               </a:ext>
             </a:extLst>
-          </p:cNvPr>
-          <p:cNvSpPr txBox="1"/>
-          <p:nvPr/>
-        </p:nvSpPr>
-        <p:spPr>
-          <a:xfrm>
-            <a:off x="7541622" y="1143182"/>
-            <a:ext cx="4272954" cy="461665"/>
+          </a:blip>
+          <a:srcRect/>
+          <a:stretch>
+            <a:fillRect/>
+          </a:stretch>
+        </p:blipFill>
+        <p:spPr bwMode="auto">
+          <a:xfrm>
+            <a:off x="247016" y="1157782"/>
+            <a:ext cx="2853632" cy="2853632"/>
           </a:xfrm>
           <a:prstGeom prst="rect">
             <a:avLst/>
           </a:prstGeom>
           <a:noFill/>
-        </p:spPr>
-        <p:txBody>
-          <a:bodyPr wrap="square" rtlCol="0">
-            <a:spAutoFit/>
-          </a:bodyPr>
-          <a:lstStyle/>
-          <a:p>
-            <a:pPr marL="342900" indent="-342900">
-              <a:buFont typeface="Arial" panose="020B0604020202020204" pitchFamily="34" charset="0"/>
-              <a:buChar char="•"/>
-            </a:pPr>
-            <a:r>
-              <a:rPr lang="hu-HU" sz="2400" b="1" dirty="0">
-                <a:solidFill>
-                  <a:schemeClr val="accent4">
-                    <a:lumMod val="75000"/>
-                  </a:schemeClr>
-                </a:solidFill>
-              </a:rPr>
-              <a:t>XAMPP</a:t>
-            </a:r>
-            <a:endParaRPr lang="hu-HU" sz="2400" dirty="0">
-              <a:solidFill>
-                <a:schemeClr val="accent4">
-                  <a:lumMod val="75000"/>
-                </a:schemeClr>
-              </a:solidFill>
-            </a:endParaRPr>
-          </a:p>
-        </p:txBody>
-      </p:sp>
+          <a:extLst>
+            <a:ext uri="{909E8E84-426E-40DD-AFC4-6F175D3DCCD1}">
+              <a14:hiddenFill xmlns:a14="http://schemas.microsoft.com/office/drawing/2010/main">
+                <a:solidFill>
+                  <a:srgbClr val="FFFFFF"/>
+                </a:solidFill>
+              </a14:hiddenFill>
+            </a:ext>
+          </a:extLst>
+        </p:spPr>
+      </p:pic>
     </p:spTree>
     <p:extLst>
       <p:ext uri="{BB962C8B-B14F-4D97-AF65-F5344CB8AC3E}">
@@ -6180,7 +6574,7 @@
         </p:nvSpPr>
         <p:spPr>
           <a:xfrm>
-            <a:off x="235023" y="1258144"/>
+            <a:off x="3125579" y="1199955"/>
             <a:ext cx="5132719" cy="1569660"/>
           </a:xfrm>
           <a:prstGeom prst="rect">
@@ -6206,7 +6600,27 @@
                   </a:schemeClr>
                 </a:solidFill>
               </a:rPr>
-              <a:t>Postman: </a:t>
+              <a:t>Postman</a:t>
+            </a:r>
+            <a:r>
+              <a:rPr lang="hu-HU" sz="2400" dirty="0">
+                <a:solidFill>
+                  <a:schemeClr val="accent4">
+                    <a:lumMod val="75000"/>
+                  </a:schemeClr>
+                </a:solidFill>
+              </a:rPr>
+              <a:t>:</a:t>
+            </a:r>
+            <a:r>
+              <a:rPr lang="hu-HU" sz="2400" b="1" dirty="0">
+                <a:solidFill>
+                  <a:schemeClr val="accent4">
+                    <a:lumMod val="75000"/>
+                  </a:schemeClr>
+                </a:solidFill>
+              </a:rPr>
+              <a:t> </a:t>
             </a:r>
             <a:r>
               <a:rPr lang="hu-HU" sz="2400" dirty="0">
@@ -6254,8 +6668,8 @@
         </p:nvSpPr>
         <p:spPr>
           <a:xfrm>
-            <a:off x="7541622" y="1143182"/>
-            <a:ext cx="4272954" cy="2677656"/>
+            <a:off x="395837" y="3266901"/>
+            <a:ext cx="5459484" cy="3046988"/>
           </a:xfrm>
           <a:prstGeom prst="rect">
             <a:avLst/>
@@ -6273,6 +6687,36 @@
               <a:buChar char="•"/>
             </a:pPr>
             <a:r>
+              <a:rPr lang="hu-HU" sz="2400" b="1" dirty="0">
+                <a:solidFill>
+                  <a:schemeClr val="accent4">
+                    <a:lumMod val="75000"/>
+                  </a:schemeClr>
+                </a:solidFill>
+              </a:rPr>
+              <a:t>Manuális </a:t>
+            </a:r>
+            <a:r>
+              <a:rPr lang="hu-HU" sz="2400" b="1" dirty="0" smtClean="0">
+                <a:solidFill>
+                  <a:schemeClr val="accent4">
+                    <a:lumMod val="75000"/>
+                  </a:schemeClr>
+                </a:solidFill>
+              </a:rPr>
+              <a:t>Teszt</a:t>
+            </a:r>
+            <a:r>
+              <a:rPr lang="hu-HU" sz="2400" dirty="0" smtClean="0">
+                <a:solidFill>
+                  <a:schemeClr val="accent4">
+                    <a:lumMod val="75000"/>
+                  </a:schemeClr>
+                </a:solidFill>
+              </a:rPr>
+              <a:t>: </a:t>
+            </a:r>
+            <a:r>
               <a:rPr lang="hu-HU" sz="2400" dirty="0">
                 <a:solidFill>
                   <a:schemeClr val="accent4">
@@ -6280,14 +6724,38 @@
                   </a:schemeClr>
                 </a:solidFill>
               </a:rPr>
-              <a:t>Manuális Teszt:</a:t>
-            </a:r>
-          </a:p>
-          <a:p>
-            <a:pPr marL="342900" indent="-342900">
-              <a:buFont typeface="Arial" panose="020B0604020202020204" pitchFamily="34" charset="0"/>
-              <a:buChar char="•"/>
-            </a:pPr>
+              <a:t>A</a:t>
+            </a:r>
+            <a:r>
+              <a:rPr lang="hu-HU" sz="2400" dirty="0" smtClean="0">
+                <a:solidFill>
+                  <a:schemeClr val="accent4">
+                    <a:lumMod val="75000"/>
+                  </a:schemeClr>
+                </a:solidFill>
+              </a:rPr>
+              <a:t>utomatizált </a:t>
+            </a:r>
+            <a:r>
+              <a:rPr lang="hu-HU" sz="2400" dirty="0">
+                <a:solidFill>
+                  <a:schemeClr val="accent4">
+                    <a:lumMod val="75000"/>
+                  </a:schemeClr>
+                </a:solidFill>
+              </a:rPr>
+              <a:t>eszközök nélkül, a végfelhasználó szerepét felvéve keresnek hibákat, hiányosságokat a </a:t>
+            </a:r>
+            <a:r>
+              <a:rPr lang="hu-HU" sz="2400" dirty="0" smtClean="0">
+                <a:solidFill>
+                  <a:schemeClr val="accent4">
+                    <a:lumMod val="75000"/>
+                  </a:schemeClr>
+                </a:solidFill>
+              </a:rPr>
+              <a:t>rendszerben.</a:t>
+            </a:r>
             <a:endParaRPr lang="hu-HU" sz="2400" dirty="0">
               <a:solidFill>
                 <a:schemeClr val="accent4">
@@ -6297,10 +6765,6 @@
             </a:endParaRPr>
           </a:p>
           <a:p>
-            <a:pPr marL="342900" indent="-342900">
-              <a:buFont typeface="Arial" panose="020B0604020202020204" pitchFamily="34" charset="0"/>
-              <a:buChar char="•"/>
-            </a:pPr>
             <a:endParaRPr lang="hu-HU" sz="2400" dirty="0">
               <a:solidFill>
                 <a:schemeClr val="accent4">
@@ -6315,6 +6779,36 @@
               <a:buChar char="•"/>
             </a:pPr>
             <a:r>
+              <a:rPr lang="hu-HU" sz="2400" b="1" dirty="0">
+                <a:solidFill>
+                  <a:schemeClr val="accent4">
+                    <a:lumMod val="75000"/>
+                  </a:schemeClr>
+                </a:solidFill>
+              </a:rPr>
+              <a:t>Unit </a:t>
+            </a:r>
+            <a:r>
+              <a:rPr lang="hu-HU" sz="2400" b="1" dirty="0" smtClean="0">
+                <a:solidFill>
+                  <a:schemeClr val="accent4">
+                    <a:lumMod val="75000"/>
+                  </a:schemeClr>
+                </a:solidFill>
+              </a:rPr>
+              <a:t>Teszt</a:t>
+            </a:r>
+            <a:r>
+              <a:rPr lang="hu-HU" sz="2400" dirty="0" smtClean="0">
+                <a:solidFill>
+                  <a:schemeClr val="accent4">
+                    <a:lumMod val="75000"/>
+                  </a:schemeClr>
+                </a:solidFill>
+              </a:rPr>
+              <a:t>: Egységteszt</a:t>
+            </a:r>
+            <a:r>
               <a:rPr lang="hu-HU" sz="2400" dirty="0">
                 <a:solidFill>
                   <a:schemeClr val="accent4">
@@ -6322,10 +6816,18 @@
                   </a:schemeClr>
                 </a:solidFill>
               </a:rPr>
-              <a:t>Unit Teszt:</a:t>
-            </a:r>
-          </a:p>
-          <a:p>
+              <a:t>, </a:t>
+            </a:r>
+            <a:r>
+              <a:rPr lang="hu-HU" sz="2400" dirty="0" smtClean="0">
+                <a:solidFill>
+                  <a:schemeClr val="accent4">
+                    <a:lumMod val="75000"/>
+                  </a:schemeClr>
+                </a:solidFill>
+              </a:rPr>
+              <a:t>mely a program egy adott egységét(pl</a:t>
+            </a:r>
             <a:r>
               <a:rPr lang="hu-HU" sz="2400" dirty="0">
                 <a:solidFill>
@@ -6334,11 +6836,118 @@
                   </a:schemeClr>
                 </a:solidFill>
               </a:rPr>
-              <a:t>     Egységteszt, mely a program    egy adott egységét(pl.: Függvény)</a:t>
-            </a:r>
-          </a:p>
-        </p:txBody>
-      </p:sp>
+              <a:t>.: Függvény</a:t>
+            </a:r>
+            <a:r>
+              <a:rPr lang="hu-HU" sz="2400" dirty="0" smtClean="0">
+                <a:solidFill>
+                  <a:schemeClr val="accent4">
+                    <a:lumMod val="75000"/>
+                  </a:schemeClr>
+                </a:solidFill>
+              </a:rPr>
+              <a:t>) ellenőrzi.</a:t>
+            </a:r>
+            <a:endParaRPr lang="hu-HU" sz="2400" dirty="0">
+              <a:solidFill>
+                <a:schemeClr val="accent4">
+                  <a:lumMod val="75000"/>
+                </a:schemeClr>
+              </a:solidFill>
+            </a:endParaRPr>
+          </a:p>
+        </p:txBody>
+      </p:sp>
+      <p:pic>
+        <p:nvPicPr>
+          <p:cNvPr id="4098" name="Picture 2" descr="https://upload.wikimedia.org/wikipedia/commons/c/c2/Postman_%28software%29.png"/>
+          <p:cNvPicPr>
+            <a:picLocks noChangeAspect="1" noChangeArrowheads="1"/>
+          </p:cNvPicPr>
+          <p:nvPr/>
+        </p:nvPicPr>
+        <p:blipFill>
+          <a:blip r:embed="rId3">
+            <a:extLst>
+              <a:ext uri="{28A0092B-C50C-407E-A947-70E740481C1C}">
+                <a14:useLocalDpi xmlns:a14="http://schemas.microsoft.com/office/drawing/2010/main" val="0"/>
+              </a:ext>
+            </a:extLst>
+          </a:blip>
+          <a:srcRect/>
+          <a:stretch>
+            <a:fillRect/>
+          </a:stretch>
+        </p:blipFill>
+        <p:spPr bwMode="auto">
+          <a:xfrm>
+            <a:off x="140104" y="1497752"/>
+            <a:ext cx="3209548" cy="974066"/>
+          </a:xfrm>
+          <a:prstGeom prst="rect">
+            <a:avLst/>
+          </a:prstGeom>
+          <a:noFill/>
+          <a:extLst>
+            <a:ext uri="{909E8E84-426E-40DD-AFC4-6F175D3DCCD1}">
+              <a14:hiddenFill xmlns:a14="http://schemas.microsoft.com/office/drawing/2010/main">
+                <a:solidFill>
+                  <a:srgbClr val="FFFFFF"/>
+                </a:solidFill>
+              </a14:hiddenFill>
+            </a:ext>
+          </a:extLst>
+        </p:spPr>
+      </p:pic>
+      <p:pic>
+        <p:nvPicPr>
+          <p:cNvPr id="4100" name="Picture 4" descr="REST Client | Postman API Platform [Free Download]"/>
+          <p:cNvPicPr>
+            <a:picLocks noChangeAspect="1" noChangeArrowheads="1"/>
+          </p:cNvPicPr>
+          <p:nvPr/>
+        </p:nvPicPr>
+        <p:blipFill>
+          <a:blip r:embed="rId4" cstate="print">
+            <a:extLst>
+              <a:ext uri="{28A0092B-C50C-407E-A947-70E740481C1C}">
+                <a14:useLocalDpi xmlns:a14="http://schemas.microsoft.com/office/drawing/2010/main" val="0"/>
+              </a:ext>
+            </a:extLst>
+          </a:blip>
+          <a:srcRect/>
+          <a:stretch>
+            <a:fillRect/>
+          </a:stretch>
+        </p:blipFill>
+        <p:spPr bwMode="auto">
+          <a:xfrm>
+            <a:off x="8258298" y="1059375"/>
+            <a:ext cx="3859931" cy="2573287"/>
+          </a:xfrm>
+          <a:prstGeom prst="rect">
+            <a:avLst/>
+          </a:prstGeom>
+          <a:noFill/>
+          <a:ln w="38100">
+            <a:solidFill>
+              <a:schemeClr val="accent1">
+                <a:lumMod val="60000"/>
+                <a:lumOff val="40000"/>
+              </a:schemeClr>
+            </a:solidFill>
+          </a:ln>
+          <a:extLst>
+            <a:ext uri="{909E8E84-426E-40DD-AFC4-6F175D3DCCD1}">
+              <a14:hiddenFill xmlns:a14="http://schemas.microsoft.com/office/drawing/2010/main">
+                <a:solidFill>
+                  <a:srgbClr val="FFFFFF"/>
+                </a:solidFill>
+              </a14:hiddenFill>
+            </a:ext>
+          </a:extLst>
+        </p:spPr>
+      </p:pic>
     </p:spTree>
     <p:extLst>
       <p:ext uri="{BB962C8B-B14F-4D97-AF65-F5344CB8AC3E}">

</xml_diff>